<commit_message>
update slides, add giveaway file
</commit_message>
<xml_diff>
--- a/aina-getting-started-accountants.pptx
+++ b/aina-getting-started-accountants.pptx
@@ -1840,7 +1840,7 @@
           <a:p>
             <a:fld id="{503F064B-41F2-4661-BDF0-BFD135E9A557}" type="datetimeFigureOut">
               <a:rPr lang="en-US" smtClean="0"/>
-              <a:t>11/5/2021</a:t>
+              <a:t>11/10/2021</a:t>
             </a:fld>
             <a:endParaRPr lang="en-US"/>
           </a:p>
@@ -2733,7 +2733,7 @@
           <a:p>
             <a:fld id="{0138B082-EFC2-46C1-B47C-51736C670379}" type="datetimeFigureOut">
               <a:rPr lang="en-US" smtClean="0"/>
-              <a:t>11/5/2021</a:t>
+              <a:t>11/10/2021</a:t>
             </a:fld>
             <a:endParaRPr lang="en-US"/>
           </a:p>
@@ -2901,7 +2901,7 @@
           <a:p>
             <a:fld id="{0138B082-EFC2-46C1-B47C-51736C670379}" type="datetimeFigureOut">
               <a:rPr lang="en-US" smtClean="0"/>
-              <a:t>11/5/2021</a:t>
+              <a:t>11/10/2021</a:t>
             </a:fld>
             <a:endParaRPr lang="en-US"/>
           </a:p>
@@ -3079,7 +3079,7 @@
           <a:p>
             <a:fld id="{0138B082-EFC2-46C1-B47C-51736C670379}" type="datetimeFigureOut">
               <a:rPr lang="en-US" smtClean="0"/>
-              <a:t>11/5/2021</a:t>
+              <a:t>11/10/2021</a:t>
             </a:fld>
             <a:endParaRPr lang="en-US"/>
           </a:p>
@@ -3247,7 +3247,7 @@
           <a:p>
             <a:fld id="{0138B082-EFC2-46C1-B47C-51736C670379}" type="datetimeFigureOut">
               <a:rPr lang="en-US" smtClean="0"/>
-              <a:t>11/5/2021</a:t>
+              <a:t>11/10/2021</a:t>
             </a:fld>
             <a:endParaRPr lang="en-US"/>
           </a:p>
@@ -3492,7 +3492,7 @@
           <a:p>
             <a:fld id="{0138B082-EFC2-46C1-B47C-51736C670379}" type="datetimeFigureOut">
               <a:rPr lang="en-US" smtClean="0"/>
-              <a:t>11/5/2021</a:t>
+              <a:t>11/10/2021</a:t>
             </a:fld>
             <a:endParaRPr lang="en-US"/>
           </a:p>
@@ -3721,7 +3721,7 @@
           <a:p>
             <a:fld id="{0138B082-EFC2-46C1-B47C-51736C670379}" type="datetimeFigureOut">
               <a:rPr lang="en-US" smtClean="0"/>
-              <a:t>11/5/2021</a:t>
+              <a:t>11/10/2021</a:t>
             </a:fld>
             <a:endParaRPr lang="en-US"/>
           </a:p>
@@ -4085,7 +4085,7 @@
           <a:p>
             <a:fld id="{0138B082-EFC2-46C1-B47C-51736C670379}" type="datetimeFigureOut">
               <a:rPr lang="en-US" smtClean="0"/>
-              <a:t>11/5/2021</a:t>
+              <a:t>11/10/2021</a:t>
             </a:fld>
             <a:endParaRPr lang="en-US"/>
           </a:p>
@@ -4202,7 +4202,7 @@
           <a:p>
             <a:fld id="{0138B082-EFC2-46C1-B47C-51736C670379}" type="datetimeFigureOut">
               <a:rPr lang="en-US" smtClean="0"/>
-              <a:t>11/5/2021</a:t>
+              <a:t>11/10/2021</a:t>
             </a:fld>
             <a:endParaRPr lang="en-US"/>
           </a:p>
@@ -4297,7 +4297,7 @@
           <a:p>
             <a:fld id="{0138B082-EFC2-46C1-B47C-51736C670379}" type="datetimeFigureOut">
               <a:rPr lang="en-US" smtClean="0"/>
-              <a:t>11/5/2021</a:t>
+              <a:t>11/10/2021</a:t>
             </a:fld>
             <a:endParaRPr lang="en-US"/>
           </a:p>
@@ -4572,7 +4572,7 @@
           <a:p>
             <a:fld id="{0138B082-EFC2-46C1-B47C-51736C670379}" type="datetimeFigureOut">
               <a:rPr lang="en-US" smtClean="0"/>
-              <a:t>11/5/2021</a:t>
+              <a:t>11/10/2021</a:t>
             </a:fld>
             <a:endParaRPr lang="en-US"/>
           </a:p>
@@ -4824,7 +4824,7 @@
           <a:p>
             <a:fld id="{0138B082-EFC2-46C1-B47C-51736C670379}" type="datetimeFigureOut">
               <a:rPr lang="en-US" smtClean="0"/>
-              <a:t>11/5/2021</a:t>
+              <a:t>11/10/2021</a:t>
             </a:fld>
             <a:endParaRPr lang="en-US"/>
           </a:p>
@@ -5035,7 +5035,7 @@
           <a:p>
             <a:fld id="{0138B082-EFC2-46C1-B47C-51736C670379}" type="datetimeFigureOut">
               <a:rPr lang="en-US" smtClean="0"/>
-              <a:t>11/5/2021</a:t>
+              <a:t>11/10/2021</a:t>
             </a:fld>
             <a:endParaRPr lang="en-US"/>
           </a:p>
@@ -5424,7 +5424,7 @@
 </file>
 
 <file path=ppt/slides/slide1.xml><?xml version="1.0" encoding="utf-8"?>
-<p:sld xmlns:a="http://schemas.openxmlformats.org/drawingml/2006/main" xmlns:r="http://schemas.openxmlformats.org/officeDocument/2006/relationships" xmlns:p="http://schemas.openxmlformats.org/presentationml/2006/main">
+<p:sld xmlns:a="http://schemas.openxmlformats.org/drawingml/2006/main" xmlns:r="http://schemas.openxmlformats.org/officeDocument/2006/relationships" xmlns:p="http://schemas.openxmlformats.org/presentationml/2006/main" show="0">
   <p:cSld>
     <p:spTree>
       <p:nvGrpSpPr>
@@ -5843,7 +5843,7 @@
                 </a:solidFill>
                 <a:latin typeface="Pragmatica" panose="020B0403040502020204" pitchFamily="34" charset="0"/>
               </a:rPr>
-              <a:t>Get 20% off with promocode LEDGER </a:t>
+              <a:t>Get 10% off with promocode LEDGER </a:t>
             </a:r>
             <a:r>
               <a:rPr lang="en-US" sz="2800" b="1" dirty="0">
@@ -5853,27 +5853,17 @@
                 <a:latin typeface="Pragmatica" panose="020B0403040502020204" pitchFamily="34" charset="0"/>
                 <a:hlinkClick r:id="rId4"/>
               </a:rPr>
-              <a:t>https://swiy.io/66Oy</a:t>
-            </a:r>
-            <a:endParaRPr lang="en-US" sz="2800" b="1" dirty="0">
-              <a:solidFill>
-                <a:srgbClr val="707070"/>
-              </a:solidFill>
-              <a:latin typeface="Pragmatica" panose="020B0403040502020204" pitchFamily="34" charset="0"/>
-            </a:endParaRPr>
-          </a:p>
-          <a:p>
-            <a:pPr lvl="1">
-              <a:buClr>
-                <a:srgbClr val="CF3338"/>
-              </a:buClr>
-            </a:pPr>
-            <a:endParaRPr lang="en-US" sz="2800" b="1" dirty="0">
-              <a:solidFill>
-                <a:srgbClr val="707070"/>
-              </a:solidFill>
-              <a:latin typeface="Pragmatica" panose="020B0403040502020204" pitchFamily="34" charset="0"/>
-            </a:endParaRPr>
+              <a:t>https://social.stringfestanalytics.com/lets-learn-python</a:t>
+            </a:r>
+            <a:r>
+              <a:rPr lang="en-US" sz="2800" b="1" dirty="0">
+                <a:solidFill>
+                  <a:srgbClr val="707070"/>
+                </a:solidFill>
+                <a:latin typeface="Pragmatica" panose="020B0403040502020204" pitchFamily="34" charset="0"/>
+              </a:rPr>
+              <a:t>  </a:t>
+            </a:r>
           </a:p>
           <a:p>
             <a:pPr lvl="1">

</xml_diff>